<commit_message>
Updated my PPP and corresponding documentation.
</commit_message>
<xml_diff>
--- a/docs/diagrams/SortedListCommand3ListStateDiagram.pptx
+++ b/docs/diagrams/SortedListCommand3ListStateDiagram.pptx
@@ -261,7 +261,7 @@
           <a:p>
             <a:fld id="{03EC4E3E-8101-482F-A883-8B55DAFF7C07}" type="datetimeFigureOut">
               <a:rPr lang="en-SG" smtClean="0"/>
-              <a:t>16/10/18</a:t>
+              <a:t>8/11/18</a:t>
             </a:fld>
             <a:endParaRPr lang="en-SG"/>
           </a:p>
@@ -461,7 +461,7 @@
           <a:p>
             <a:fld id="{03EC4E3E-8101-482F-A883-8B55DAFF7C07}" type="datetimeFigureOut">
               <a:rPr lang="en-SG" smtClean="0"/>
-              <a:t>16/10/18</a:t>
+              <a:t>8/11/18</a:t>
             </a:fld>
             <a:endParaRPr lang="en-SG"/>
           </a:p>
@@ -671,7 +671,7 @@
           <a:p>
             <a:fld id="{03EC4E3E-8101-482F-A883-8B55DAFF7C07}" type="datetimeFigureOut">
               <a:rPr lang="en-SG" smtClean="0"/>
-              <a:t>16/10/18</a:t>
+              <a:t>8/11/18</a:t>
             </a:fld>
             <a:endParaRPr lang="en-SG"/>
           </a:p>
@@ -871,7 +871,7 @@
           <a:p>
             <a:fld id="{03EC4E3E-8101-482F-A883-8B55DAFF7C07}" type="datetimeFigureOut">
               <a:rPr lang="en-SG" smtClean="0"/>
-              <a:t>16/10/18</a:t>
+              <a:t>8/11/18</a:t>
             </a:fld>
             <a:endParaRPr lang="en-SG"/>
           </a:p>
@@ -1147,7 +1147,7 @@
           <a:p>
             <a:fld id="{03EC4E3E-8101-482F-A883-8B55DAFF7C07}" type="datetimeFigureOut">
               <a:rPr lang="en-SG" smtClean="0"/>
-              <a:t>16/10/18</a:t>
+              <a:t>8/11/18</a:t>
             </a:fld>
             <a:endParaRPr lang="en-SG"/>
           </a:p>
@@ -1415,7 +1415,7 @@
           <a:p>
             <a:fld id="{03EC4E3E-8101-482F-A883-8B55DAFF7C07}" type="datetimeFigureOut">
               <a:rPr lang="en-SG" smtClean="0"/>
-              <a:t>16/10/18</a:t>
+              <a:t>8/11/18</a:t>
             </a:fld>
             <a:endParaRPr lang="en-SG"/>
           </a:p>
@@ -1830,7 +1830,7 @@
           <a:p>
             <a:fld id="{03EC4E3E-8101-482F-A883-8B55DAFF7C07}" type="datetimeFigureOut">
               <a:rPr lang="en-SG" smtClean="0"/>
-              <a:t>16/10/18</a:t>
+              <a:t>8/11/18</a:t>
             </a:fld>
             <a:endParaRPr lang="en-SG"/>
           </a:p>
@@ -1972,7 +1972,7 @@
           <a:p>
             <a:fld id="{03EC4E3E-8101-482F-A883-8B55DAFF7C07}" type="datetimeFigureOut">
               <a:rPr lang="en-SG" smtClean="0"/>
-              <a:t>16/10/18</a:t>
+              <a:t>8/11/18</a:t>
             </a:fld>
             <a:endParaRPr lang="en-SG"/>
           </a:p>
@@ -2085,7 +2085,7 @@
           <a:p>
             <a:fld id="{03EC4E3E-8101-482F-A883-8B55DAFF7C07}" type="datetimeFigureOut">
               <a:rPr lang="en-SG" smtClean="0"/>
-              <a:t>16/10/18</a:t>
+              <a:t>8/11/18</a:t>
             </a:fld>
             <a:endParaRPr lang="en-SG"/>
           </a:p>
@@ -2398,7 +2398,7 @@
           <a:p>
             <a:fld id="{03EC4E3E-8101-482F-A883-8B55DAFF7C07}" type="datetimeFigureOut">
               <a:rPr lang="en-SG" smtClean="0"/>
-              <a:t>16/10/18</a:t>
+              <a:t>8/11/18</a:t>
             </a:fld>
             <a:endParaRPr lang="en-SG"/>
           </a:p>
@@ -2687,7 +2687,7 @@
           <a:p>
             <a:fld id="{03EC4E3E-8101-482F-A883-8B55DAFF7C07}" type="datetimeFigureOut">
               <a:rPr lang="en-SG" smtClean="0"/>
-              <a:t>16/10/18</a:t>
+              <a:t>8/11/18</a:t>
             </a:fld>
             <a:endParaRPr lang="en-SG"/>
           </a:p>
@@ -2930,7 +2930,7 @@
           <a:p>
             <a:fld id="{03EC4E3E-8101-482F-A883-8B55DAFF7C07}" type="datetimeFigureOut">
               <a:rPr lang="en-SG" smtClean="0"/>
-              <a:t>16/10/18</a:t>
+              <a:t>8/11/18</a:t>
             </a:fld>
             <a:endParaRPr lang="en-SG"/>
           </a:p>
@@ -3362,7 +3362,7 @@
           <p:nvPr>
             <p:extLst>
               <p:ext uri="{D42A27DB-BD31-4B8C-83A1-F6EECF244321}">
-                <p14:modId xmlns:p14="http://schemas.microsoft.com/office/powerpoint/2010/main" val="2058432389"/>
+                <p14:modId xmlns:p14="http://schemas.microsoft.com/office/powerpoint/2010/main" val="3502767859"/>
               </p:ext>
             </p:extLst>
           </p:nvPr>
@@ -3518,7 +3518,7 @@
             <a:pPr algn="ctr"/>
             <a:r>
               <a:rPr lang="en-US" dirty="0"/>
-              <a:t>n/Esther…</a:t>
+              <a:t>n/Bella…</a:t>
             </a:r>
           </a:p>
           <a:p>
@@ -3594,7 +3594,7 @@
           <p:nvPr>
             <p:extLst>
               <p:ext uri="{D42A27DB-BD31-4B8C-83A1-F6EECF244321}">
-                <p14:modId xmlns:p14="http://schemas.microsoft.com/office/powerpoint/2010/main" val="331080439"/>
+                <p14:modId xmlns:p14="http://schemas.microsoft.com/office/powerpoint/2010/main" val="2930224523"/>
               </p:ext>
             </p:extLst>
           </p:nvPr>
@@ -3626,7 +3626,7 @@
                     <a:p>
                       <a:r>
                         <a:rPr lang="en-SG" u="sng" dirty="0" err="1"/>
-                        <a:t>David:</a:t>
+                        <a:t>Bella:</a:t>
                       </a:r>
                       <a:r>
                         <a:rPr lang="en-SG" sz="1800" u="sng" dirty="0" err="1"/>
@@ -3662,7 +3662,7 @@
           <p:nvPr>
             <p:extLst>
               <p:ext uri="{D42A27DB-BD31-4B8C-83A1-F6EECF244321}">
-                <p14:modId xmlns:p14="http://schemas.microsoft.com/office/powerpoint/2010/main" val="3672688638"/>
+                <p14:modId xmlns:p14="http://schemas.microsoft.com/office/powerpoint/2010/main" val="2730681099"/>
               </p:ext>
             </p:extLst>
           </p:nvPr>
@@ -3730,7 +3730,7 @@
           <p:nvPr>
             <p:extLst>
               <p:ext uri="{D42A27DB-BD31-4B8C-83A1-F6EECF244321}">
-                <p14:modId xmlns:p14="http://schemas.microsoft.com/office/powerpoint/2010/main" val="2177356121"/>
+                <p14:modId xmlns:p14="http://schemas.microsoft.com/office/powerpoint/2010/main" val="2403109644"/>
               </p:ext>
             </p:extLst>
           </p:nvPr>
@@ -3798,7 +3798,7 @@
           <p:nvPr>
             <p:extLst>
               <p:ext uri="{D42A27DB-BD31-4B8C-83A1-F6EECF244321}">
-                <p14:modId xmlns:p14="http://schemas.microsoft.com/office/powerpoint/2010/main" val="3401311498"/>
+                <p14:modId xmlns:p14="http://schemas.microsoft.com/office/powerpoint/2010/main" val="2117276683"/>
               </p:ext>
             </p:extLst>
           </p:nvPr>
@@ -3830,7 +3830,7 @@
                     <a:p>
                       <a:r>
                         <a:rPr lang="en-SG" u="sng" dirty="0" err="1"/>
-                        <a:t>Esther:</a:t>
+                        <a:t>David:</a:t>
                       </a:r>
                       <a:r>
                         <a:rPr lang="en-SG" sz="1800" u="sng" dirty="0" err="1"/>

</xml_diff>